<commit_message>
Actualización reglas del curso
</commit_message>
<xml_diff>
--- a/clases/01-Introduccion.pptx
+++ b/clases/01-Introduccion.pptx
@@ -20670,7 +20670,7 @@
             <a:pPr lvl="1"/>
             <a:r>
               <a:rPr lang="es-CL" dirty="0"/>
-              <a:t>Se elimina el peor laboratorio.</a:t>
+              <a:t>Se elimina el laboratorio con la peor nota.</a:t>
             </a:r>
           </a:p>
         </p:txBody>
@@ -21049,7 +21049,15 @@
             </a:pPr>
             <a:r>
               <a:rPr lang="es-ES" dirty="0"/>
-              <a:t>Días bonus: 5 días hábiles para atrasarse sin penalización y distribuibles como ustedes quieran.</a:t>
+              <a:t>Días bonus: </a:t>
+            </a:r>
+            <a:r>
+              <a:rPr lang="es-ES"/>
+              <a:t>7 días para </a:t>
+            </a:r>
+            <a:r>
+              <a:rPr lang="es-ES" dirty="0"/>
+              <a:t>atrasarse sin penalización y distribuibles como ustedes quieran.</a:t>
             </a:r>
           </a:p>
           <a:p>

</xml_diff>